<commit_message>
cambio en la presentación
</commit_message>
<xml_diff>
--- a/Archivos de trabajo/Yami/Paper ITCRM avances.pptx
+++ b/Archivos de trabajo/Yami/Paper ITCRM avances.pptx
@@ -706,7 +706,7 @@
           <a:p>
             <a:fld id="{63D193A1-2DAB-45D5-92F1-EB622BEC63D8}" type="datetimeFigureOut">
               <a:rPr lang="es-AR" smtClean="0"/>
-              <a:t>10/2/2026</a:t>
+              <a:t>11/2/2026</a:t>
             </a:fld>
             <a:endParaRPr lang="es-AR"/>
           </a:p>
@@ -906,7 +906,7 @@
           <a:p>
             <a:fld id="{63D193A1-2DAB-45D5-92F1-EB622BEC63D8}" type="datetimeFigureOut">
               <a:rPr lang="es-AR" smtClean="0"/>
-              <a:t>10/2/2026</a:t>
+              <a:t>11/2/2026</a:t>
             </a:fld>
             <a:endParaRPr lang="es-AR"/>
           </a:p>
@@ -1116,7 +1116,7 @@
           <a:p>
             <a:fld id="{63D193A1-2DAB-45D5-92F1-EB622BEC63D8}" type="datetimeFigureOut">
               <a:rPr lang="es-AR" smtClean="0"/>
-              <a:t>10/2/2026</a:t>
+              <a:t>11/2/2026</a:t>
             </a:fld>
             <a:endParaRPr lang="es-AR"/>
           </a:p>
@@ -1316,7 +1316,7 @@
           <a:p>
             <a:fld id="{63D193A1-2DAB-45D5-92F1-EB622BEC63D8}" type="datetimeFigureOut">
               <a:rPr lang="es-AR" smtClean="0"/>
-              <a:t>10/2/2026</a:t>
+              <a:t>11/2/2026</a:t>
             </a:fld>
             <a:endParaRPr lang="es-AR"/>
           </a:p>
@@ -1592,7 +1592,7 @@
           <a:p>
             <a:fld id="{63D193A1-2DAB-45D5-92F1-EB622BEC63D8}" type="datetimeFigureOut">
               <a:rPr lang="es-AR" smtClean="0"/>
-              <a:t>10/2/2026</a:t>
+              <a:t>11/2/2026</a:t>
             </a:fld>
             <a:endParaRPr lang="es-AR"/>
           </a:p>
@@ -1860,7 +1860,7 @@
           <a:p>
             <a:fld id="{63D193A1-2DAB-45D5-92F1-EB622BEC63D8}" type="datetimeFigureOut">
               <a:rPr lang="es-AR" smtClean="0"/>
-              <a:t>10/2/2026</a:t>
+              <a:t>11/2/2026</a:t>
             </a:fld>
             <a:endParaRPr lang="es-AR"/>
           </a:p>
@@ -2275,7 +2275,7 @@
           <a:p>
             <a:fld id="{63D193A1-2DAB-45D5-92F1-EB622BEC63D8}" type="datetimeFigureOut">
               <a:rPr lang="es-AR" smtClean="0"/>
-              <a:t>10/2/2026</a:t>
+              <a:t>11/2/2026</a:t>
             </a:fld>
             <a:endParaRPr lang="es-AR"/>
           </a:p>
@@ -2417,7 +2417,7 @@
           <a:p>
             <a:fld id="{63D193A1-2DAB-45D5-92F1-EB622BEC63D8}" type="datetimeFigureOut">
               <a:rPr lang="es-AR" smtClean="0"/>
-              <a:t>10/2/2026</a:t>
+              <a:t>11/2/2026</a:t>
             </a:fld>
             <a:endParaRPr lang="es-AR"/>
           </a:p>
@@ -2530,7 +2530,7 @@
           <a:p>
             <a:fld id="{63D193A1-2DAB-45D5-92F1-EB622BEC63D8}" type="datetimeFigureOut">
               <a:rPr lang="es-AR" smtClean="0"/>
-              <a:t>10/2/2026</a:t>
+              <a:t>11/2/2026</a:t>
             </a:fld>
             <a:endParaRPr lang="es-AR"/>
           </a:p>
@@ -2843,7 +2843,7 @@
           <a:p>
             <a:fld id="{63D193A1-2DAB-45D5-92F1-EB622BEC63D8}" type="datetimeFigureOut">
               <a:rPr lang="es-AR" smtClean="0"/>
-              <a:t>10/2/2026</a:t>
+              <a:t>11/2/2026</a:t>
             </a:fld>
             <a:endParaRPr lang="es-AR"/>
           </a:p>
@@ -3132,7 +3132,7 @@
           <a:p>
             <a:fld id="{63D193A1-2DAB-45D5-92F1-EB622BEC63D8}" type="datetimeFigureOut">
               <a:rPr lang="es-AR" smtClean="0"/>
-              <a:t>10/2/2026</a:t>
+              <a:t>11/2/2026</a:t>
             </a:fld>
             <a:endParaRPr lang="es-AR"/>
           </a:p>
@@ -3375,7 +3375,7 @@
           <a:p>
             <a:fld id="{63D193A1-2DAB-45D5-92F1-EB622BEC63D8}" type="datetimeFigureOut">
               <a:rPr lang="es-AR" smtClean="0"/>
-              <a:t>10/2/2026</a:t>
+              <a:t>11/2/2026</a:t>
             </a:fld>
             <a:endParaRPr lang="es-AR"/>
           </a:p>
@@ -4949,14 +4949,14 @@
           <p:nvPr>
             <p:extLst>
               <p:ext uri="{D42A27DB-BD31-4B8C-83A1-F6EECF244321}">
-                <p14:modId xmlns:p14="http://schemas.microsoft.com/office/powerpoint/2010/main" val="1780638433"/>
+                <p14:modId xmlns:p14="http://schemas.microsoft.com/office/powerpoint/2010/main" val="1316629569"/>
               </p:ext>
             </p:extLst>
           </p:nvPr>
         </p:nvGraphicFramePr>
         <p:xfrm>
           <a:off x="6839712" y="1131217"/>
-          <a:ext cx="5036938" cy="5006340"/>
+          <a:ext cx="5036938" cy="4727121"/>
         </p:xfrm>
         <a:graphic>
           <a:graphicData uri="http://schemas.openxmlformats.org/drawingml/2006/table">
@@ -5709,17 +5709,7 @@
                       <a:pPr fontAlgn="t">
                         <a:buNone/>
                       </a:pPr>
-                      <a:br>
-                        <a:rPr lang="es-AR" sz="2400">
-                          <a:effectLst/>
-                        </a:rPr>
-                      </a:br>
-                      <a:br>
-                        <a:rPr lang="es-AR" sz="2400">
-                          <a:effectLst/>
-                        </a:rPr>
-                      </a:br>
-                      <a:endParaRPr lang="es-AR" sz="2400">
+                      <a:endParaRPr lang="es-AR" sz="2400" dirty="0">
                         <a:effectLst/>
                       </a:endParaRPr>
                     </a:p>
@@ -5731,7 +5721,7 @@
                         <a:buNone/>
                       </a:pPr>
                       <a:r>
-                        <a:rPr lang="es-AR" sz="1050" b="0" i="0" u="none" strike="noStrike">
+                        <a:rPr lang="es-AR" sz="1050" b="0" i="0" u="none" strike="noStrike" dirty="0">
                           <a:solidFill>
                             <a:srgbClr val="000000"/>
                           </a:solidFill>
@@ -5740,7 +5730,7 @@
                         </a:rPr>
                         <a:t>2002</a:t>
                       </a:r>
-                      <a:endParaRPr lang="es-AR" sz="2400">
+                      <a:endParaRPr lang="es-AR" sz="2400" dirty="0">
                         <a:effectLst/>
                       </a:endParaRPr>
                     </a:p>
@@ -7515,32 +7505,24 @@
                     <a:bodyPr/>
                     <a:lstStyle/>
                     <a:p>
-                      <a:pPr fontAlgn="t">
+                      <a:pPr algn="ctr" fontAlgn="t">
                         <a:buNone/>
                       </a:pPr>
                       <a:br>
-                        <a:rPr lang="es-AR" sz="2400">
+                        <a:rPr lang="es-AR" sz="2400" dirty="0">
                           <a:effectLst/>
                         </a:rPr>
                       </a:br>
-                      <a:br>
-                        <a:rPr lang="es-AR" sz="2400">
-                          <a:effectLst/>
-                        </a:rPr>
-                      </a:br>
-                      <a:endParaRPr lang="es-AR" sz="2400">
+                      <a:endParaRPr lang="es-AR" sz="2400" dirty="0">
                         <a:effectLst/>
                       </a:endParaRPr>
                     </a:p>
                     <a:p>
-                      <a:pPr algn="ctr" rtl="0" fontAlgn="t">
-                        <a:spcBef>
-                          <a:spcPts val="1200"/>
-                        </a:spcBef>
+                      <a:pPr algn="ctr" fontAlgn="t">
                         <a:buNone/>
                       </a:pPr>
                       <a:r>
-                        <a:rPr lang="es-AR" sz="1050" b="0" i="0" u="none" strike="noStrike">
+                        <a:rPr lang="es-AR" sz="1050" b="0" i="0" u="none" strike="noStrike" dirty="0">
                           <a:solidFill>
                             <a:srgbClr val="000000"/>
                           </a:solidFill>
@@ -7549,7 +7531,7 @@
                         </a:rPr>
                         <a:t>2012</a:t>
                       </a:r>
-                      <a:endParaRPr lang="es-AR" sz="2400">
+                      <a:endParaRPr lang="es-AR" sz="2400" dirty="0">
                         <a:effectLst/>
                       </a:endParaRPr>
                     </a:p>
@@ -9324,32 +9306,31 @@
                     <a:bodyPr/>
                     <a:lstStyle/>
                     <a:p>
-                      <a:pPr fontAlgn="t">
+                      <a:pPr algn="ctr" fontAlgn="t">
                         <a:buNone/>
                       </a:pPr>
-                      <a:br>
-                        <a:rPr lang="es-AR" sz="2400">
-                          <a:effectLst/>
-                        </a:rPr>
-                      </a:br>
-                      <a:br>
-                        <a:rPr lang="es-AR" sz="2400">
-                          <a:effectLst/>
-                        </a:rPr>
-                      </a:br>
-                      <a:endParaRPr lang="es-AR" sz="2400">
+                      <a:endParaRPr lang="es-AR" sz="2400" dirty="0">
                         <a:effectLst/>
                       </a:endParaRPr>
                     </a:p>
                     <a:p>
-                      <a:pPr algn="ctr" rtl="0" fontAlgn="t">
-                        <a:spcBef>
-                          <a:spcPts val="1200"/>
-                        </a:spcBef>
+                      <a:pPr algn="ctr" fontAlgn="t">
+                        <a:buNone/>
+                      </a:pPr>
+                      <a:endParaRPr lang="es-AR" sz="1400" b="0" i="0" u="none" strike="noStrike" dirty="0">
+                        <a:solidFill>
+                          <a:srgbClr val="000000"/>
+                        </a:solidFill>
+                        <a:effectLst/>
+                        <a:latin typeface="Arial" panose="020B0604020202020204" pitchFamily="34" charset="0"/>
+                      </a:endParaRPr>
+                    </a:p>
+                    <a:p>
+                      <a:pPr algn="ctr" fontAlgn="t">
                         <a:buNone/>
                       </a:pPr>
                       <a:r>
-                        <a:rPr lang="es-AR" sz="1050" b="0" i="0" u="none" strike="noStrike">
+                        <a:rPr lang="es-AR" sz="1050" b="0" i="0" u="none" strike="noStrike" dirty="0">
                           <a:solidFill>
                             <a:srgbClr val="000000"/>
                           </a:solidFill>
@@ -9358,7 +9339,7 @@
                         </a:rPr>
                         <a:t>2024</a:t>
                       </a:r>
-                      <a:endParaRPr lang="es-AR" sz="2400">
+                      <a:endParaRPr lang="es-AR" sz="2400" dirty="0">
                         <a:effectLst/>
                       </a:endParaRPr>
                     </a:p>
@@ -12097,6 +12078,36 @@
           </a:p>
         </p:txBody>
       </p:sp>
+      <p:pic>
+        <p:nvPicPr>
+          <p:cNvPr id="7" name="Imagen 6" descr="Una captura de pantalla de una computadora&#10;&#10;El contenido generado por IA puede ser incorrecto.">
+            <a:extLst>
+              <a:ext uri="{FF2B5EF4-FFF2-40B4-BE49-F238E27FC236}">
+                <a16:creationId xmlns:a16="http://schemas.microsoft.com/office/drawing/2014/main" id="{5EA6C1E6-C4A4-D2EB-F6E6-446EFB919EA6}"/>
+              </a:ext>
+            </a:extLst>
+          </p:cNvPr>
+          <p:cNvPicPr>
+            <a:picLocks noChangeAspect="1"/>
+          </p:cNvPicPr>
+          <p:nvPr/>
+        </p:nvPicPr>
+        <p:blipFill>
+          <a:blip r:embed="rId3"/>
+          <a:stretch>
+            <a:fillRect/>
+          </a:stretch>
+        </p:blipFill>
+        <p:spPr>
+          <a:xfrm>
+            <a:off x="0" y="1507057"/>
+            <a:ext cx="12192000" cy="3843886"/>
+          </a:xfrm>
+          <a:prstGeom prst="rect">
+            <a:avLst/>
+          </a:prstGeom>
+        </p:spPr>
+      </p:pic>
     </p:spTree>
     <p:extLst>
       <p:ext uri="{BB962C8B-B14F-4D97-AF65-F5344CB8AC3E}">

</xml_diff>